<commit_message>
Presentation with first motivation slide filled in
</commit_message>
<xml_diff>
--- a/presentation/mta_presentation_Clarke_Stephen_Barry.pptx
+++ b/presentation/mta_presentation_Clarke_Stephen_Barry.pptx
@@ -3673,28 +3673,109 @@
           </a:p>
         </p:txBody>
       </p:sp>
-      <p:sp>
-        <p:nvSpPr>
-          <p:cNvPr id="3" name="Content Placeholder 2">
-            <a:extLst>
-              <a:ext uri="{FF2B5EF4-FFF2-40B4-BE49-F238E27FC236}">
-                <a16:creationId xmlns:a16="http://schemas.microsoft.com/office/drawing/2014/main" id="{0E2D81A1-2C1B-544F-BFFD-7E4A82B546BA}"/>
-              </a:ext>
-            </a:extLst>
-          </p:cNvPr>
-          <p:cNvSpPr>
-            <a:spLocks noGrp="1"/>
-          </p:cNvSpPr>
+      <p:pic>
+        <p:nvPicPr>
+          <p:cNvPr id="4" name="Content Placeholder 3">
+            <a:extLst>
+              <a:ext uri="{FF2B5EF4-FFF2-40B4-BE49-F238E27FC236}">
+                <a16:creationId xmlns:a16="http://schemas.microsoft.com/office/drawing/2014/main" id="{22E7AA5D-F7A8-DC47-9CD2-02E496C29BDA}"/>
+              </a:ext>
+            </a:extLst>
+          </p:cNvPr>
+          <p:cNvPicPr>
+            <a:picLocks noGrp="1" noChangeAspect="1"/>
+          </p:cNvPicPr>
           <p:nvPr>
             <p:ph idx="1"/>
           </p:nvPr>
-        </p:nvSpPr>
-        <p:spPr/>
-        <p:txBody>
-          <a:bodyPr/>
-          <a:lstStyle/>
-          <a:p>
-            <a:endParaRPr lang="en-US"/>
+        </p:nvPicPr>
+        <p:blipFill>
+          <a:blip r:embed="rId2"/>
+          <a:stretch>
+            <a:fillRect/>
+          </a:stretch>
+        </p:blipFill>
+        <p:spPr>
+          <a:xfrm>
+            <a:off x="7207250" y="1148557"/>
+            <a:ext cx="4292600" cy="3048000"/>
+          </a:xfrm>
+          <a:prstGeom prst="rect">
+            <a:avLst/>
+          </a:prstGeom>
+        </p:spPr>
+      </p:pic>
+      <p:sp>
+        <p:nvSpPr>
+          <p:cNvPr id="6" name="TextBox 5">
+            <a:extLst>
+              <a:ext uri="{FF2B5EF4-FFF2-40B4-BE49-F238E27FC236}">
+                <a16:creationId xmlns:a16="http://schemas.microsoft.com/office/drawing/2014/main" id="{BEAD7A0A-9961-B449-85AC-938A9D6055A7}"/>
+              </a:ext>
+            </a:extLst>
+          </p:cNvPr>
+          <p:cNvSpPr txBox="1"/>
+          <p:nvPr/>
+        </p:nvSpPr>
+        <p:spPr>
+          <a:xfrm>
+            <a:off x="605641" y="1656894"/>
+            <a:ext cx="6341424" cy="1477328"/>
+          </a:xfrm>
+          <a:prstGeom prst="rect">
+            <a:avLst/>
+          </a:prstGeom>
+          <a:noFill/>
+        </p:spPr>
+        <p:txBody>
+          <a:bodyPr wrap="square" rtlCol="0">
+            <a:spAutoFit/>
+          </a:bodyPr>
+          <a:lstStyle/>
+          <a:p>
+            <a:r>
+              <a:rPr lang="en-US" sz="3000" dirty="0"/>
+              <a:t>To advise WTWY on the best use of street teams working in advance of the New York City 2019 Summer Gala.</a:t>
+            </a:r>
+          </a:p>
+        </p:txBody>
+      </p:sp>
+      <p:sp>
+        <p:nvSpPr>
+          <p:cNvPr id="8" name="TextBox 7">
+            <a:extLst>
+              <a:ext uri="{FF2B5EF4-FFF2-40B4-BE49-F238E27FC236}">
+                <a16:creationId xmlns:a16="http://schemas.microsoft.com/office/drawing/2014/main" id="{A4F05FFF-1090-804A-8D45-5E7DDB1ED1DC}"/>
+              </a:ext>
+            </a:extLst>
+          </p:cNvPr>
+          <p:cNvSpPr txBox="1"/>
+          <p:nvPr/>
+        </p:nvSpPr>
+        <p:spPr>
+          <a:xfrm>
+            <a:off x="605640" y="3547753"/>
+            <a:ext cx="6601609" cy="1938992"/>
+          </a:xfrm>
+          <a:prstGeom prst="rect">
+            <a:avLst/>
+          </a:prstGeom>
+          <a:noFill/>
+        </p:spPr>
+        <p:txBody>
+          <a:bodyPr wrap="square" rtlCol="0">
+            <a:spAutoFit/>
+          </a:bodyPr>
+          <a:lstStyle/>
+          <a:p>
+            <a:pPr marL="285750" indent="-285750">
+              <a:buFont typeface="Arial" panose="020B0604020202020204" pitchFamily="34" charset="0"/>
+              <a:buChar char="•"/>
+            </a:pPr>
+            <a:r>
+              <a:rPr lang="en-US" sz="3000" dirty="0"/>
+              <a:t>In order to maximize the street teams’ effectiveness, recommend which stations on which days WTWY should send its people. </a:t>
+            </a:r>
           </a:p>
         </p:txBody>
       </p:sp>
@@ -3777,7 +3858,7 @@
           <a:bodyPr/>
           <a:lstStyle/>
           <a:p>
-            <a:endParaRPr lang="en-US"/>
+            <a:endParaRPr lang="en-US" dirty="0"/>
           </a:p>
         </p:txBody>
       </p:sp>
@@ -3869,7 +3950,16 @@
           <a:bodyPr/>
           <a:lstStyle/>
           <a:p>
-            <a:endParaRPr lang="en-US"/>
+            <a:r>
+              <a:rPr lang="en-US" dirty="0"/>
+              <a:t>Looked at data for the month of May, 2018.  </a:t>
+            </a:r>
+          </a:p>
+          <a:p>
+            <a:endParaRPr lang="en-US" dirty="0"/>
+          </a:p>
+          <a:p>
+            <a:endParaRPr lang="en-US" dirty="0"/>
           </a:p>
         </p:txBody>
       </p:sp>

</xml_diff>